<commit_message>
Minor changes to presentation. Added a lab.
</commit_message>
<xml_diff>
--- a/Vue-Animations/Vue-Animations.pptx
+++ b/Vue-Animations/Vue-Animations.pptx
@@ -315,7 +315,7 @@
             <a:fld id="{FE5B4EDC-59C0-49C7-8ADA-5A781B329E02}" type="datetimeFigureOut">
               <a:rPr lang="en-US"/>
               <a:pPr/>
-              <a:t>17-Dec-18</a:t>
+              <a:t>19-Dec-18</a:t>
             </a:fld>
             <a:endParaRPr dirty="0"/>
           </a:p>
@@ -514,7 +514,7 @@
             <a:fld id="{F2D8D46A-B586-417D-BFBD-8C8FE0AAF762}" type="datetimeFigureOut">
               <a:rPr lang="en-US" smtClean="0"/>
               <a:pPr/>
-              <a:t>17-Dec-18</a:t>
+              <a:t>19-Dec-18</a:t>
             </a:fld>
             <a:endParaRPr lang="en-US" dirty="0"/>
           </a:p>
@@ -3009,7 +3009,7 @@
             <a:fld id="{055373AC-9AA7-423B-BA00-BA1C74164DBD}" type="datetime1">
               <a:rPr lang="en-US" smtClean="0"/>
               <a:pPr/>
-              <a:t>17-Dec-18</a:t>
+              <a:t>19-Dec-18</a:t>
             </a:fld>
             <a:endParaRPr lang="en-US" dirty="0"/>
           </a:p>
@@ -3370,7 +3370,7 @@
             <a:fld id="{055373AC-9AA7-423B-BA00-BA1C74164DBD}" type="datetime1">
               <a:rPr lang="en-US" smtClean="0"/>
               <a:pPr/>
-              <a:t>17-Dec-18</a:t>
+              <a:t>19-Dec-18</a:t>
             </a:fld>
             <a:endParaRPr lang="en-US" dirty="0"/>
           </a:p>
@@ -4988,7 +4988,7 @@
             <a:fld id="{055373AC-9AA7-423B-BA00-BA1C74164DBD}" type="datetime1">
               <a:rPr lang="en-US" smtClean="0"/>
               <a:pPr/>
-              <a:t>17-Dec-18</a:t>
+              <a:t>19-Dec-18</a:t>
             </a:fld>
             <a:endParaRPr lang="en-US" dirty="0"/>
           </a:p>
@@ -5688,7 +5688,7 @@
             <a:fld id="{055373AC-9AA7-423B-BA00-BA1C74164DBD}" type="datetime1">
               <a:rPr lang="en-US" smtClean="0"/>
               <a:pPr/>
-              <a:t>17-Dec-18</a:t>
+              <a:t>19-Dec-18</a:t>
             </a:fld>
             <a:endParaRPr lang="en-US" dirty="0"/>
           </a:p>
@@ -6092,7 +6092,7 @@
             <a:fld id="{055373AC-9AA7-423B-BA00-BA1C74164DBD}" type="datetime1">
               <a:rPr lang="en-US" smtClean="0"/>
               <a:pPr/>
-              <a:t>17-Dec-18</a:t>
+              <a:t>19-Dec-18</a:t>
             </a:fld>
             <a:endParaRPr lang="en-US" dirty="0"/>
           </a:p>
@@ -6454,7 +6454,7 @@
             <a:fld id="{055373AC-9AA7-423B-BA00-BA1C74164DBD}" type="datetime1">
               <a:rPr lang="en-US" smtClean="0"/>
               <a:pPr/>
-              <a:t>17-Dec-18</a:t>
+              <a:t>19-Dec-18</a:t>
             </a:fld>
             <a:endParaRPr lang="en-US" dirty="0"/>
           </a:p>
@@ -7107,7 +7107,7 @@
             <a:fld id="{055373AC-9AA7-423B-BA00-BA1C74164DBD}" type="datetime1">
               <a:rPr lang="en-US" smtClean="0"/>
               <a:pPr/>
-              <a:t>17-Dec-18</a:t>
+              <a:t>19-Dec-18</a:t>
             </a:fld>
             <a:endParaRPr lang="en-US" dirty="0"/>
           </a:p>
@@ -7557,7 +7557,7 @@
             <a:fld id="{055373AC-9AA7-423B-BA00-BA1C74164DBD}" type="datetime1">
               <a:rPr lang="en-US" smtClean="0"/>
               <a:pPr/>
-              <a:t>17-Dec-18</a:t>
+              <a:t>19-Dec-18</a:t>
             </a:fld>
             <a:endParaRPr lang="en-US" dirty="0"/>
           </a:p>
@@ -7734,7 +7734,7 @@
             <a:fld id="{055373AC-9AA7-423B-BA00-BA1C74164DBD}" type="datetime1">
               <a:rPr lang="en-US" smtClean="0"/>
               <a:pPr/>
-              <a:t>17-Dec-18</a:t>
+              <a:t>19-Dec-18</a:t>
             </a:fld>
             <a:endParaRPr lang="en-US" dirty="0"/>
           </a:p>
@@ -8297,7 +8297,7 @@
           <a:p>
             <a:r>
               <a:rPr lang="en-US" dirty="0"/>
-              <a:t>Animations</a:t>
+              <a:t>Vue Animations</a:t>
             </a:r>
             <a:endParaRPr lang="bg-BG" dirty="0"/>
           </a:p>
@@ -8475,50 +8475,38 @@
       </p:sp>
       <p:pic>
         <p:nvPicPr>
-          <p:cNvPr id="1026" name="Picture 2" descr="Vue.js logo | Software logo">
+          <p:cNvPr id="3" name="Picture 2">
             <a:extLst>
               <a:ext uri="{FF2B5EF4-FFF2-40B4-BE49-F238E27FC236}">
-                <a16:creationId xmlns:a16="http://schemas.microsoft.com/office/drawing/2014/main" id="{6C9CE24F-01A5-4367-B718-20D79EDD100C}"/>
+                <a16:creationId xmlns:a16="http://schemas.microsoft.com/office/drawing/2014/main" id="{5CE3C802-365C-476F-B09E-0B42FC56F75C}"/>
               </a:ext>
             </a:extLst>
           </p:cNvPr>
           <p:cNvPicPr>
-            <a:picLocks noChangeAspect="1" noChangeArrowheads="1"/>
+            <a:picLocks noChangeAspect="1"/>
           </p:cNvPicPr>
           <p:nvPr/>
         </p:nvPicPr>
-        <p:blipFill rotWithShape="1">
-          <a:blip r:embed="rId3" cstate="print">
+        <p:blipFill>
+          <a:blip r:embed="rId3">
             <a:extLst>
               <a:ext uri="{28A0092B-C50C-407E-A947-70E740481C1C}">
                 <a14:useLocalDpi xmlns:a14="http://schemas.microsoft.com/office/drawing/2010/main" val="0"/>
               </a:ext>
             </a:extLst>
           </a:blip>
-          <a:srcRect/>
-          <a:stretch/>
+          <a:stretch>
+            <a:fillRect/>
+          </a:stretch>
         </p:blipFill>
-        <p:spPr bwMode="auto">
+        <p:spPr>
           <a:xfrm>
-            <a:off x="3888000" y="864000"/>
-            <a:ext cx="4320000" cy="4140000"/>
+            <a:off x="3960813" y="1389391"/>
+            <a:ext cx="4267198" cy="4079218"/>
           </a:xfrm>
-          <a:prstGeom prst="ellipse">
+          <a:prstGeom prst="rect">
             <a:avLst/>
           </a:prstGeom>
-          <a:ln>
-            <a:noFill/>
-          </a:ln>
-          <a:effectLst/>
-          <a:extLst>
-            <a:ext uri="{909E8E84-426E-40DD-AFC4-6F175D3DCCD1}">
-              <a14:hiddenFill xmlns:a14="http://schemas.microsoft.com/office/drawing/2010/main">
-                <a:solidFill>
-                  <a:srgbClr val="FFFFFF"/>
-                </a:solidFill>
-              </a14:hiddenFill>
-            </a:ext>
-          </a:extLst>
         </p:spPr>
       </p:pic>
     </p:spTree>
@@ -11539,7 +11527,14 @@
             </a:r>
             <a:r>
               <a:rPr lang="en-US" sz="2800" dirty="0"/>
-              <a:t>. One of the most common two-element transitions is between a list </a:t>
+              <a:t>. </a:t>
+            </a:r>
+            <a:br>
+              <a:rPr lang="en-US" sz="2800" dirty="0"/>
+            </a:br>
+            <a:r>
+              <a:rPr lang="en-US" sz="2800" dirty="0"/>
+              <a:t>One of the most common two-element transitions is between a list </a:t>
             </a:r>
             <a:br>
               <a:rPr lang="en-US" sz="2800" dirty="0"/>
@@ -11953,7 +11948,7 @@
             </a:pPr>
             <a:r>
               <a:rPr lang="en-US" sz="2400" dirty="0"/>
-              <a:t>When toggling between elements that have </a:t>
+              <a:t>Elements with </a:t>
             </a:r>
             <a:r>
               <a:rPr lang="en-US" sz="2400" b="1" dirty="0">
@@ -11965,8 +11960,11 @@
             </a:r>
             <a:r>
               <a:rPr lang="en-US" sz="2400" dirty="0"/>
-              <a:t>, you must tell Vue that they are distinct elements by giving them unique </a:t>
-            </a:r>
+              <a:t> should be made distinct by having unique </a:t>
+            </a:r>
+            <a:br>
+              <a:rPr lang="en-US" sz="2400" dirty="0"/>
+            </a:br>
             <a:r>
               <a:rPr lang="en-US" sz="2400" b="1" dirty="0">
                 <a:solidFill>
@@ -11977,21 +11975,7 @@
             </a:r>
             <a:r>
               <a:rPr lang="en-US" sz="2400" dirty="0"/>
-              <a:t> attributes. </a:t>
-            </a:r>
-            <a:br>
-              <a:rPr lang="en-US" sz="2400" dirty="0"/>
-            </a:br>
-            <a:r>
-              <a:rPr lang="en-US" sz="2400" dirty="0"/>
-              <a:t>Otherwise, Vue’s compiler will only replace the content of the element for </a:t>
-            </a:r>
-            <a:br>
-              <a:rPr lang="en-US" sz="2400" dirty="0"/>
-            </a:br>
-            <a:r>
-              <a:rPr lang="en-US" sz="2400" dirty="0"/>
-              <a:t>efficiency. Even when technically unnecessary though, </a:t>
+              <a:t> attributes. Even though it's technically unnecessary, </a:t>
             </a:r>
             <a:r>
               <a:rPr lang="en-US" sz="2400" b="1" dirty="0">
@@ -12080,7 +12064,7 @@
         </p:nvSpPr>
         <p:spPr>
           <a:xfrm>
-            <a:off x="3355822" y="3040298"/>
+            <a:off x="3351212" y="2590800"/>
             <a:ext cx="7239030" cy="3511319"/>
           </a:xfrm>
           <a:prstGeom prst="rect">
@@ -12328,7 +12312,7 @@
         </p:blipFill>
         <p:spPr bwMode="auto">
           <a:xfrm>
-            <a:off x="9762463" y="3200400"/>
+            <a:off x="9757853" y="2750902"/>
             <a:ext cx="832389" cy="832389"/>
           </a:xfrm>
           <a:prstGeom prst="rect">
@@ -12586,7 +12570,14 @@
             </a:r>
             <a:r>
               <a:rPr lang="en-US" sz="3200" dirty="0"/>
-              <a:t>: Current element transitions out first, then when complete, the new element transitions in.</a:t>
+              <a:t>: Current element transitions out first, then when </a:t>
+            </a:r>
+            <a:br>
+              <a:rPr lang="en-US" sz="3200" dirty="0"/>
+            </a:br>
+            <a:r>
+              <a:rPr lang="en-US" sz="3200" dirty="0"/>
+              <a:t>complete, the new element transitions in.</a:t>
             </a:r>
           </a:p>
         </p:txBody>
@@ -15025,36 +15016,6 @@
           </a:p>
         </p:txBody>
       </p:sp>
-      <p:pic>
-        <p:nvPicPr>
-          <p:cNvPr id="4" name="Картина 3"/>
-          <p:cNvPicPr>
-            <a:picLocks noChangeAspect="1"/>
-          </p:cNvPicPr>
-          <p:nvPr/>
-        </p:nvPicPr>
-        <p:blipFill>
-          <a:blip r:embed="rId2">
-            <a:extLst>
-              <a:ext uri="{28A0092B-C50C-407E-A947-70E740481C1C}">
-                <a14:useLocalDpi xmlns:a14="http://schemas.microsoft.com/office/drawing/2010/main" val="0"/>
-              </a:ext>
-            </a:extLst>
-          </a:blip>
-          <a:stretch>
-            <a:fillRect/>
-          </a:stretch>
-        </p:blipFill>
-        <p:spPr>
-          <a:xfrm>
-            <a:off x="5299337" y="1842861"/>
-            <a:ext cx="1590150" cy="1590150"/>
-          </a:xfrm>
-          <a:prstGeom prst="rect">
-            <a:avLst/>
-          </a:prstGeom>
-        </p:spPr>
-      </p:pic>
       <p:sp>
         <p:nvSpPr>
           <p:cNvPr id="7" name="Arrow: Curved Left 6">
@@ -15075,11 +15036,7 @@
           <a:prstGeom prst="curvedLeftArrow">
             <a:avLst/>
           </a:prstGeom>
-          <a:solidFill>
-            <a:schemeClr val="dk2">
-              <a:alpha val="80000"/>
-            </a:schemeClr>
-          </a:solidFill>
+          <a:noFill/>
           <a:ln w="19050">
             <a:solidFill>
               <a:schemeClr val="bg2">
@@ -15150,11 +15107,7 @@
           <a:prstGeom prst="curvedLeftArrow">
             <a:avLst/>
           </a:prstGeom>
-          <a:solidFill>
-            <a:schemeClr val="dk2">
-              <a:alpha val="80000"/>
-            </a:schemeClr>
-          </a:solidFill>
+          <a:noFill/>
           <a:ln w="19050">
             <a:solidFill>
               <a:schemeClr val="bg2">
@@ -15205,6 +15158,44 @@
           </a:p>
         </p:txBody>
       </p:sp>
+      <p:pic>
+        <p:nvPicPr>
+          <p:cNvPr id="1028" name="Picture 4" descr="Data List Icon | Windows 8 Iconset | Icons8">
+            <a:extLst>
+              <a:ext uri="{FF2B5EF4-FFF2-40B4-BE49-F238E27FC236}">
+                <a16:creationId xmlns:a16="http://schemas.microsoft.com/office/drawing/2014/main" id="{3A03CD08-7620-4E63-AF45-438C712680C1}"/>
+              </a:ext>
+            </a:extLst>
+          </p:cNvPr>
+          <p:cNvPicPr>
+            <a:picLocks noChangeAspect="1" noChangeArrowheads="1"/>
+          </p:cNvPicPr>
+          <p:nvPr/>
+        </p:nvPicPr>
+        <p:blipFill>
+          <a:blip r:embed="rId2" cstate="print">
+            <a:extLst>
+              <a:ext uri="{28A0092B-C50C-407E-A947-70E740481C1C}">
+                <a14:useLocalDpi xmlns:a14="http://schemas.microsoft.com/office/drawing/2010/main" val="0"/>
+              </a:ext>
+            </a:extLst>
+          </a:blip>
+          <a:srcRect/>
+          <a:stretch>
+            <a:fillRect/>
+          </a:stretch>
+        </p:blipFill>
+        <p:spPr bwMode="auto">
+          <a:xfrm>
+            <a:off x="5256212" y="1752600"/>
+            <a:ext cx="1676400" cy="1676400"/>
+          </a:xfrm>
+          <a:prstGeom prst="rect">
+            <a:avLst/>
+          </a:prstGeom>
+          <a:noFill/>
+        </p:spPr>
+      </p:pic>
     </p:spTree>
     <p:extLst>
       <p:ext uri="{BB962C8B-B14F-4D97-AF65-F5344CB8AC3E}">
@@ -15334,7 +15325,7 @@
             </a:r>
             <a:r>
               <a:rPr lang="en-US" sz="3000" dirty="0"/>
-              <a:t>, it renders an actual element: a </a:t>
+              <a:t>, it renders a </a:t>
             </a:r>
             <a:r>
               <a:rPr lang="en-US" sz="3000" b="1" dirty="0">
@@ -15347,21 +15338,14 @@
             </a:r>
             <a:r>
               <a:rPr lang="en-US" sz="3000" dirty="0"/>
-              <a:t> by </a:t>
+              <a:t> by default. You can </a:t>
             </a:r>
             <a:br>
               <a:rPr lang="en-US" sz="3000" dirty="0"/>
             </a:br>
             <a:r>
               <a:rPr lang="en-US" sz="3000" dirty="0"/>
-              <a:t>default. You can change the element that’s rendered with the tag </a:t>
-            </a:r>
-            <a:br>
-              <a:rPr lang="en-US" sz="3000" dirty="0"/>
-            </a:br>
-            <a:r>
-              <a:rPr lang="en-US" sz="3000" dirty="0"/>
-              <a:t>attribute.</a:t>
+              <a:t>change the element that’s rendered with the tag attribute.</a:t>
             </a:r>
           </a:p>
           <a:p>
@@ -16783,41 +16767,30 @@
             </a:r>
             <a:r>
               <a:rPr lang="en-US" dirty="0"/>
-              <a:t> class. Like the other classes, its prefix will match the value of a provided </a:t>
-            </a:r>
-            <a:r>
-              <a:rPr lang="en-US" b="1" dirty="0">
-                <a:solidFill>
-                  <a:schemeClr val="bg1"/>
-                </a:solidFill>
-                <a:latin typeface="Consolas" panose="020B0609020204030204" pitchFamily="49" charset="0"/>
-              </a:rPr>
-              <a:t>name</a:t>
-            </a:r>
+              <a:t> class. </a:t>
+            </a:r>
+          </a:p>
+          <a:p>
+            <a:pPr marL="0" indent="0">
+              <a:buNone/>
+            </a:pPr>
             <a:r>
               <a:rPr lang="en-US" dirty="0"/>
-              <a:t> attribute and you can also manually specify a class with </a:t>
+              <a:t>This class is mostly useful for specifying the transition </a:t>
             </a:r>
             <a:br>
               <a:rPr lang="en-US" dirty="0"/>
             </a:br>
             <a:r>
               <a:rPr lang="en-US" dirty="0"/>
-              <a:t>the </a:t>
-            </a:r>
-            <a:r>
-              <a:rPr lang="en-US" b="1" dirty="0">
-                <a:solidFill>
-                  <a:schemeClr val="bg1"/>
-                </a:solidFill>
-                <a:latin typeface="Consolas" panose="020B0609020204030204" pitchFamily="49" charset="0"/>
-              </a:rPr>
-              <a:t>move-class</a:t>
-            </a:r>
-            <a:r>
-              <a:rPr lang="en-US" dirty="0"/>
-              <a:t> attribute.</a:t>
-            </a:r>
+              <a:t>timing and easing curve.</a:t>
+            </a:r>
+          </a:p>
+          <a:p>
+            <a:pPr marL="0" indent="0">
+              <a:buNone/>
+            </a:pPr>
+            <a:endParaRPr lang="en-US" dirty="0"/>
           </a:p>
         </p:txBody>
       </p:sp>
@@ -16927,6 +16900,55 @@
                                           <p:spTgt spid="7">
                                             <p:txEl>
                                               <p:pRg st="1" end="1"/>
+                                            </p:txEl>
+                                          </p:spTgt>
+                                        </p:tgtEl>
+                                        <p:attrNameLst>
+                                          <p:attrName>style.visibility</p:attrName>
+                                        </p:attrNameLst>
+                                      </p:cBhvr>
+                                      <p:to>
+                                        <p:strVal val="visible"/>
+                                      </p:to>
+                                    </p:set>
+                                  </p:childTnLst>
+                                </p:cTn>
+                              </p:par>
+                            </p:childTnLst>
+                          </p:cTn>
+                        </p:par>
+                      </p:childTnLst>
+                    </p:cTn>
+                  </p:par>
+                  <p:par>
+                    <p:cTn id="7" fill="hold">
+                      <p:stCondLst>
+                        <p:cond delay="indefinite"/>
+                      </p:stCondLst>
+                      <p:childTnLst>
+                        <p:par>
+                          <p:cTn id="8" fill="hold">
+                            <p:stCondLst>
+                              <p:cond delay="0"/>
+                            </p:stCondLst>
+                            <p:childTnLst>
+                              <p:par>
+                                <p:cTn id="9" presetID="1" presetClass="entr" presetSubtype="0" fill="hold" nodeType="clickEffect">
+                                  <p:stCondLst>
+                                    <p:cond delay="0"/>
+                                  </p:stCondLst>
+                                  <p:childTnLst>
+                                    <p:set>
+                                      <p:cBhvr>
+                                        <p:cTn id="10" dur="1" fill="hold">
+                                          <p:stCondLst>
+                                            <p:cond delay="0"/>
+                                          </p:stCondLst>
+                                        </p:cTn>
+                                        <p:tgtEl>
+                                          <p:spTgt spid="7">
+                                            <p:txEl>
+                                              <p:pRg st="2" end="2"/>
                                             </p:txEl>
                                           </p:spTgt>
                                         </p:tgtEl>
@@ -19143,7 +19165,7 @@
               </a:ext>
             </a:extLst>
           </a:blip>
-          <a:srcRect l="-3822" t="6534" r="-689" b="14898"/>
+          <a:srcRect l="-3822" r="-689"/>
           <a:stretch/>
         </p:blipFill>
         <p:spPr>

</xml_diff>